<commit_message>
final edits to all documents
</commit_message>
<xml_diff>
--- a/Vivino_Presentation.pptx
+++ b/Vivino_Presentation.pptx
@@ -235,7 +235,7 @@
           <a:p>
             <a:fld id="{306B5594-B9FA-45DD-AE77-2DE8B02D3524}" type="datetimeFigureOut">
               <a:rPr lang="en-ID" smtClean="0"/>
-              <a:t>13/05/2021</a:t>
+              <a:t>21/05/2021</a:t>
             </a:fld>
             <a:endParaRPr lang="en-ID"/>
           </a:p>
@@ -412,7 +412,7 @@
           <a:p>
             <a:fld id="{27CBB685-20D4-4B48-A3F7-FA349DAE514C}" type="datetimeFigureOut">
               <a:rPr lang="en-ID" smtClean="0"/>
-              <a:t>13/05/2021</a:t>
+              <a:t>21/05/2021</a:t>
             </a:fld>
             <a:endParaRPr lang="en-ID"/>
           </a:p>

</xml_diff>